<commit_message>
Updated: Just Changed Formatting/Picture
</commit_message>
<xml_diff>
--- a/FinProjTeamStats.pptx
+++ b/FinProjTeamStats.pptx
@@ -12,8 +12,8 @@
     <p:sldId id="311" r:id="rId9"/>
     <p:sldId id="312" r:id="rId10"/>
     <p:sldId id="317" r:id="rId11"/>
-    <p:sldId id="314" r:id="rId12"/>
-    <p:sldId id="316" r:id="rId13"/>
+    <p:sldId id="316" r:id="rId12"/>
+    <p:sldId id="314" r:id="rId13"/>
   </p:sldIdLst>
   <p:sldSz cx="12192000" cy="6858000"/>
   <p:notesSz cx="6858000" cy="9144000"/>
@@ -6502,7 +6502,7 @@
 <dgm:dataModel xmlns:dgm="http://schemas.openxmlformats.org/drawingml/2006/diagram" xmlns:a="http://schemas.openxmlformats.org/drawingml/2006/main">
   <dgm:ptLst>
     <dgm:pt modelId="{01A66772-F185-4D58-B8BB-E9370D7A7A2B}" type="doc">
-      <dgm:prSet loTypeId="urn:microsoft.com/office/officeart/2005/8/layout/process5" loCatId="process" qsTypeId="urn:microsoft.com/office/officeart/2005/8/quickstyle/simple1" qsCatId="simple" csTypeId="urn:microsoft.com/office/officeart/2005/8/colors/colorful5" csCatId="colorful" phldr="1"/>
+      <dgm:prSet loTypeId="urn:microsoft.com/office/officeart/2005/8/layout/default" loCatId="list" qsTypeId="urn:microsoft.com/office/officeart/2005/8/quickstyle/simple1" qsCatId="simple" csTypeId="urn:microsoft.com/office/officeart/2005/8/colors/colorful5" csCatId="colorful" phldr="1"/>
       <dgm:spPr/>
       <dgm:t>
         <a:bodyPr/>
@@ -6651,7 +6651,7 @@
         </a:p>
       </dgm:t>
     </dgm:pt>
-    <dgm:pt modelId="{4386DDB2-D01C-4C88-89AF-7A2511C476C2}" type="pres">
+    <dgm:pt modelId="{D09FD27C-9E2D-417A-9A1B-37854E625346}" type="pres">
       <dgm:prSet presAssocID="{01A66772-F185-4D58-B8BB-E9370D7A7A2B}" presName="diagram" presStyleCnt="0">
         <dgm:presLayoutVars>
           <dgm:dir/>
@@ -6660,7 +6660,7 @@
       </dgm:prSet>
       <dgm:spPr/>
     </dgm:pt>
-    <dgm:pt modelId="{4DD2B9DF-2F38-4404-9AD0-1863C528F590}" type="pres">
+    <dgm:pt modelId="{A5215218-4F2E-4DD3-9B69-761CB2662B72}" type="pres">
       <dgm:prSet presAssocID="{40FC4FFE-8987-4A26-B7F4-8A516F18ADAE}" presName="node" presStyleLbl="node1" presStyleIdx="0" presStyleCnt="3">
         <dgm:presLayoutVars>
           <dgm:bulletEnabled val="1"/>
@@ -6668,15 +6668,11 @@
       </dgm:prSet>
       <dgm:spPr/>
     </dgm:pt>
-    <dgm:pt modelId="{E130B0C0-463D-4C37-A3FD-C40E4CC6E6EF}" type="pres">
-      <dgm:prSet presAssocID="{5B62599A-5C9B-48E7-896E-EA782AC60C8B}" presName="sibTrans" presStyleLbl="sibTrans2D1" presStyleIdx="0" presStyleCnt="2"/>
+    <dgm:pt modelId="{4C6EA4FF-44E1-43ED-A87E-661892F48A56}" type="pres">
+      <dgm:prSet presAssocID="{5B62599A-5C9B-48E7-896E-EA782AC60C8B}" presName="sibTrans" presStyleCnt="0"/>
       <dgm:spPr/>
     </dgm:pt>
-    <dgm:pt modelId="{C8D00A5A-A009-41F7-B189-D5A2A23FBC68}" type="pres">
-      <dgm:prSet presAssocID="{5B62599A-5C9B-48E7-896E-EA782AC60C8B}" presName="connectorText" presStyleLbl="sibTrans2D1" presStyleIdx="0" presStyleCnt="2"/>
-      <dgm:spPr/>
-    </dgm:pt>
-    <dgm:pt modelId="{AA3CBD35-0917-44A8-B1CA-B1EA3BE07E1C}" type="pres">
+    <dgm:pt modelId="{2CA9E6A4-8135-4714-8349-841CD368E662}" type="pres">
       <dgm:prSet presAssocID="{49225C73-1633-42F1-AB3B-7CB183E5F8B8}" presName="node" presStyleLbl="node1" presStyleIdx="1" presStyleCnt="3">
         <dgm:presLayoutVars>
           <dgm:bulletEnabled val="1"/>
@@ -6684,15 +6680,11 @@
       </dgm:prSet>
       <dgm:spPr/>
     </dgm:pt>
-    <dgm:pt modelId="{B2963401-5824-48F0-87B4-9F599222A714}" type="pres">
-      <dgm:prSet presAssocID="{9646853A-8964-4519-A5B1-0B7D18B2983D}" presName="sibTrans" presStyleLbl="sibTrans2D1" presStyleIdx="1" presStyleCnt="2"/>
+    <dgm:pt modelId="{6B951766-9A57-43B8-8CD5-E3500EEBD4F6}" type="pres">
+      <dgm:prSet presAssocID="{9646853A-8964-4519-A5B1-0B7D18B2983D}" presName="sibTrans" presStyleCnt="0"/>
       <dgm:spPr/>
     </dgm:pt>
-    <dgm:pt modelId="{D8F20840-F752-43C6-A7E6-E7ADE51E4D50}" type="pres">
-      <dgm:prSet presAssocID="{9646853A-8964-4519-A5B1-0B7D18B2983D}" presName="connectorText" presStyleLbl="sibTrans2D1" presStyleIdx="1" presStyleCnt="2"/>
-      <dgm:spPr/>
-    </dgm:pt>
-    <dgm:pt modelId="{2B94F1A7-76E2-4051-A8E5-FE9E5E521038}" type="pres">
+    <dgm:pt modelId="{98F8B0AB-F7F7-432F-8915-0C240C98BD01}" type="pres">
       <dgm:prSet presAssocID="{1C383F32-22E8-4F62-A3E0-BDC3D5F48992}" presName="node" presStyleLbl="node1" presStyleIdx="2" presStyleCnt="3">
         <dgm:presLayoutVars>
           <dgm:bulletEnabled val="1"/>
@@ -6703,23 +6695,17 @@
   </dgm:ptLst>
   <dgm:cxnLst>
     <dgm:cxn modelId="{A9154303-8225-4248-91DC-1B0156A35F07}" srcId="{01A66772-F185-4D58-B8BB-E9370D7A7A2B}" destId="{49225C73-1633-42F1-AB3B-7CB183E5F8B8}" srcOrd="1" destOrd="0" parTransId="{1A0E2090-1D4F-438A-8766-B6030CE01ADD}" sibTransId="{9646853A-8964-4519-A5B1-0B7D18B2983D}"/>
-    <dgm:cxn modelId="{D791F82C-F0E6-412F-84CC-054FE7C5358B}" type="presOf" srcId="{9646853A-8964-4519-A5B1-0B7D18B2983D}" destId="{D8F20840-F752-43C6-A7E6-E7ADE51E4D50}" srcOrd="1" destOrd="0" presId="urn:microsoft.com/office/officeart/2005/8/layout/process5"/>
+    <dgm:cxn modelId="{CA42B309-8979-4AD2-AAED-B01CF8986800}" type="presOf" srcId="{49225C73-1633-42F1-AB3B-7CB183E5F8B8}" destId="{2CA9E6A4-8135-4714-8349-841CD368E662}" srcOrd="0" destOrd="0" presId="urn:microsoft.com/office/officeart/2005/8/layout/default"/>
+    <dgm:cxn modelId="{E159B61F-6F8D-4D15-BBFC-A5886F93F6D2}" type="presOf" srcId="{40FC4FFE-8987-4A26-B7F4-8A516F18ADAE}" destId="{A5215218-4F2E-4DD3-9B69-761CB2662B72}" srcOrd="0" destOrd="0" presId="urn:microsoft.com/office/officeart/2005/8/layout/default"/>
     <dgm:cxn modelId="{C7AD8469-3C68-4AF9-AB82-79B0043AA120}" srcId="{01A66772-F185-4D58-B8BB-E9370D7A7A2B}" destId="{40FC4FFE-8987-4A26-B7F4-8A516F18ADAE}" srcOrd="0" destOrd="0" parTransId="{CAD7EF86-FB23-41F6-BF42-040B36DEFDB1}" sibTransId="{5B62599A-5C9B-48E7-896E-EA782AC60C8B}"/>
-    <dgm:cxn modelId="{F8F1206A-DDF8-47DC-922E-147B81C7A6EA}" type="presOf" srcId="{5B62599A-5C9B-48E7-896E-EA782AC60C8B}" destId="{C8D00A5A-A009-41F7-B189-D5A2A23FBC68}" srcOrd="1" destOrd="0" presId="urn:microsoft.com/office/officeart/2005/8/layout/process5"/>
+    <dgm:cxn modelId="{B642DE4D-B0DD-4FDE-BDBC-0A51E5E59CE5}" type="presOf" srcId="{01A66772-F185-4D58-B8BB-E9370D7A7A2B}" destId="{D09FD27C-9E2D-417A-9A1B-37854E625346}" srcOrd="0" destOrd="0" presId="urn:microsoft.com/office/officeart/2005/8/layout/default"/>
     <dgm:cxn modelId="{C4CCE57E-E871-46D6-BAD5-880252C95D22}" srcId="{01A66772-F185-4D58-B8BB-E9370D7A7A2B}" destId="{1C383F32-22E8-4F62-A3E0-BDC3D5F48992}" srcOrd="2" destOrd="0" parTransId="{A7920A2F-3244-4159-AF04-6A1D38B7B317}" sibTransId="{8500F72A-2C6D-4FDF-9C1D-CA691380EB0B}"/>
-    <dgm:cxn modelId="{F1D07EB1-B74E-4E52-A07A-1088A8E0D542}" type="presOf" srcId="{01A66772-F185-4D58-B8BB-E9370D7A7A2B}" destId="{4386DDB2-D01C-4C88-89AF-7A2511C476C2}" srcOrd="0" destOrd="0" presId="urn:microsoft.com/office/officeart/2005/8/layout/process5"/>
-    <dgm:cxn modelId="{04C8DFBC-9FD1-428C-96EA-42E553096089}" type="presOf" srcId="{40FC4FFE-8987-4A26-B7F4-8A516F18ADAE}" destId="{4DD2B9DF-2F38-4404-9AD0-1863C528F590}" srcOrd="0" destOrd="0" presId="urn:microsoft.com/office/officeart/2005/8/layout/process5"/>
-    <dgm:cxn modelId="{354B3DBF-D4D2-448C-A2FE-C487035153A0}" type="presOf" srcId="{49225C73-1633-42F1-AB3B-7CB183E5F8B8}" destId="{AA3CBD35-0917-44A8-B1CA-B1EA3BE07E1C}" srcOrd="0" destOrd="0" presId="urn:microsoft.com/office/officeart/2005/8/layout/process5"/>
-    <dgm:cxn modelId="{9F8781C5-6BBC-4714-A4D0-994C081707F2}" type="presOf" srcId="{1C383F32-22E8-4F62-A3E0-BDC3D5F48992}" destId="{2B94F1A7-76E2-4051-A8E5-FE9E5E521038}" srcOrd="0" destOrd="0" presId="urn:microsoft.com/office/officeart/2005/8/layout/process5"/>
-    <dgm:cxn modelId="{8CEE52CD-8415-4401-919F-FBC504D1CEB4}" type="presOf" srcId="{5B62599A-5C9B-48E7-896E-EA782AC60C8B}" destId="{E130B0C0-463D-4C37-A3FD-C40E4CC6E6EF}" srcOrd="0" destOrd="0" presId="urn:microsoft.com/office/officeart/2005/8/layout/process5"/>
-    <dgm:cxn modelId="{DF0E10D2-84FD-4479-B750-21BF3AB00340}" type="presOf" srcId="{9646853A-8964-4519-A5B1-0B7D18B2983D}" destId="{B2963401-5824-48F0-87B4-9F599222A714}" srcOrd="0" destOrd="0" presId="urn:microsoft.com/office/officeart/2005/8/layout/process5"/>
-    <dgm:cxn modelId="{2B76F3C0-22EA-41D6-8A2A-D3FCD8C69C99}" type="presParOf" srcId="{4386DDB2-D01C-4C88-89AF-7A2511C476C2}" destId="{4DD2B9DF-2F38-4404-9AD0-1863C528F590}" srcOrd="0" destOrd="0" presId="urn:microsoft.com/office/officeart/2005/8/layout/process5"/>
-    <dgm:cxn modelId="{DD3679D8-081D-4BBE-862B-E89DF5E35023}" type="presParOf" srcId="{4386DDB2-D01C-4C88-89AF-7A2511C476C2}" destId="{E130B0C0-463D-4C37-A3FD-C40E4CC6E6EF}" srcOrd="1" destOrd="0" presId="urn:microsoft.com/office/officeart/2005/8/layout/process5"/>
-    <dgm:cxn modelId="{B9CBD3DC-0DC0-4150-8EC1-B62C78AABDAB}" type="presParOf" srcId="{E130B0C0-463D-4C37-A3FD-C40E4CC6E6EF}" destId="{C8D00A5A-A009-41F7-B189-D5A2A23FBC68}" srcOrd="0" destOrd="0" presId="urn:microsoft.com/office/officeart/2005/8/layout/process5"/>
-    <dgm:cxn modelId="{40AEB9D1-9465-4A88-A668-2ED024DE4EAA}" type="presParOf" srcId="{4386DDB2-D01C-4C88-89AF-7A2511C476C2}" destId="{AA3CBD35-0917-44A8-B1CA-B1EA3BE07E1C}" srcOrd="2" destOrd="0" presId="urn:microsoft.com/office/officeart/2005/8/layout/process5"/>
-    <dgm:cxn modelId="{CDB6D2BB-B486-4F0A-9C19-0031F6A23F0C}" type="presParOf" srcId="{4386DDB2-D01C-4C88-89AF-7A2511C476C2}" destId="{B2963401-5824-48F0-87B4-9F599222A714}" srcOrd="3" destOrd="0" presId="urn:microsoft.com/office/officeart/2005/8/layout/process5"/>
-    <dgm:cxn modelId="{6BD54334-FD83-4B6A-991F-E0C8B090E4A1}" type="presParOf" srcId="{B2963401-5824-48F0-87B4-9F599222A714}" destId="{D8F20840-F752-43C6-A7E6-E7ADE51E4D50}" srcOrd="0" destOrd="0" presId="urn:microsoft.com/office/officeart/2005/8/layout/process5"/>
-    <dgm:cxn modelId="{62E4F722-4D1F-4499-904A-477694AF5947}" type="presParOf" srcId="{4386DDB2-D01C-4C88-89AF-7A2511C476C2}" destId="{2B94F1A7-76E2-4051-A8E5-FE9E5E521038}" srcOrd="4" destOrd="0" presId="urn:microsoft.com/office/officeart/2005/8/layout/process5"/>
+    <dgm:cxn modelId="{90E46B9D-8A13-4E4A-9E84-D2C127DEB7C5}" type="presOf" srcId="{1C383F32-22E8-4F62-A3E0-BDC3D5F48992}" destId="{98F8B0AB-F7F7-432F-8915-0C240C98BD01}" srcOrd="0" destOrd="0" presId="urn:microsoft.com/office/officeart/2005/8/layout/default"/>
+    <dgm:cxn modelId="{8EF9702B-BDDE-4466-B8D9-7EF76737AB38}" type="presParOf" srcId="{D09FD27C-9E2D-417A-9A1B-37854E625346}" destId="{A5215218-4F2E-4DD3-9B69-761CB2662B72}" srcOrd="0" destOrd="0" presId="urn:microsoft.com/office/officeart/2005/8/layout/default"/>
+    <dgm:cxn modelId="{01642D9E-BD42-4F0A-B1A1-047FFAFDFBE7}" type="presParOf" srcId="{D09FD27C-9E2D-417A-9A1B-37854E625346}" destId="{4C6EA4FF-44E1-43ED-A87E-661892F48A56}" srcOrd="1" destOrd="0" presId="urn:microsoft.com/office/officeart/2005/8/layout/default"/>
+    <dgm:cxn modelId="{355C6B4A-A672-4272-AD01-EF5D79AA6894}" type="presParOf" srcId="{D09FD27C-9E2D-417A-9A1B-37854E625346}" destId="{2CA9E6A4-8135-4714-8349-841CD368E662}" srcOrd="2" destOrd="0" presId="urn:microsoft.com/office/officeart/2005/8/layout/default"/>
+    <dgm:cxn modelId="{AC0DC2F1-2FF2-416F-ABC9-D216AD5E6F02}" type="presParOf" srcId="{D09FD27C-9E2D-417A-9A1B-37854E625346}" destId="{6B951766-9A57-43B8-8CD5-E3500EEBD4F6}" srcOrd="3" destOrd="0" presId="urn:microsoft.com/office/officeart/2005/8/layout/default"/>
+    <dgm:cxn modelId="{0234ABC2-F0C4-401B-A9C2-410AAD6016ED}" type="presParOf" srcId="{D09FD27C-9E2D-417A-9A1B-37854E625346}" destId="{98F8B0AB-F7F7-432F-8915-0C240C98BD01}" srcOrd="4" destOrd="0" presId="urn:microsoft.com/office/officeart/2005/8/layout/default"/>
   </dgm:cxnLst>
   <dgm:bg/>
   <dgm:whole/>
@@ -8782,20 +8768,18 @@
       <dsp:cNvGrpSpPr/>
     </dsp:nvGrpSpPr>
     <dsp:grpSpPr/>
-    <dsp:sp modelId="{4DD2B9DF-2F38-4404-9AD0-1863C528F590}">
+    <dsp:sp modelId="{A5215218-4F2E-4DD3-9B69-761CB2662B72}">
       <dsp:nvSpPr>
         <dsp:cNvPr id="0" name=""/>
         <dsp:cNvSpPr/>
       </dsp:nvSpPr>
       <dsp:spPr>
         <a:xfrm>
-          <a:off x="8840" y="1100351"/>
-          <a:ext cx="2642294" cy="1585376"/>
+          <a:off x="0" y="950065"/>
+          <a:ext cx="3143249" cy="1885950"/>
         </a:xfrm>
-        <a:prstGeom prst="roundRect">
-          <a:avLst>
-            <a:gd name="adj" fmla="val 10000"/>
-          </a:avLst>
+        <a:prstGeom prst="rect">
+          <a:avLst/>
         </a:prstGeom>
         <a:solidFill>
           <a:schemeClr val="accent5">
@@ -8833,12 +8817,12 @@
         </a:fontRef>
       </dsp:style>
       <dsp:txBody>
-        <a:bodyPr spcFirstLastPara="0" vert="horz" wrap="square" lIns="76200" tIns="76200" rIns="76200" bIns="76200" numCol="1" spcCol="1270" anchor="ctr" anchorCtr="0">
+        <a:bodyPr spcFirstLastPara="0" vert="horz" wrap="square" lIns="95250" tIns="95250" rIns="95250" bIns="95250" numCol="1" spcCol="1270" anchor="ctr" anchorCtr="0">
           <a:noAutofit/>
         </a:bodyPr>
         <a:lstStyle/>
         <a:p>
-          <a:pPr marL="0" lvl="0" indent="0" algn="ctr" defTabSz="889000">
+          <a:pPr marL="0" lvl="0" indent="0" algn="ctr" defTabSz="1111250">
             <a:lnSpc>
               <a:spcPct val="90000"/>
             </a:lnSpc>
@@ -8852,20 +8836,20 @@
             <a:defRPr cap="all"/>
           </a:pPr>
           <a:r>
-            <a:rPr lang="en-US" sz="2000" kern="1200" dirty="0"/>
+            <a:rPr lang="en-US" sz="2500" kern="1200" dirty="0"/>
             <a:t>Crud for html &amp; </a:t>
           </a:r>
           <a:r>
-            <a:rPr lang="en-US" sz="2000" kern="1200" dirty="0" err="1"/>
+            <a:rPr lang="en-US" sz="2500" kern="1200" dirty="0" err="1"/>
             <a:t>js</a:t>
           </a:r>
           <a:r>
-            <a:rPr lang="en-US" sz="2000" kern="1200" dirty="0"/>
+            <a:rPr lang="en-US" sz="2500" kern="1200" dirty="0"/>
             <a:t> </a:t>
           </a:r>
         </a:p>
         <a:p>
-          <a:pPr marL="0" lvl="0" indent="0" algn="ctr" defTabSz="889000">
+          <a:pPr marL="0" lvl="0" indent="0" algn="ctr" defTabSz="1111250">
             <a:lnSpc>
               <a:spcPct val="90000"/>
             </a:lnSpc>
@@ -8879,99 +8863,28 @@
             <a:defRPr cap="all"/>
           </a:pPr>
           <a:r>
-            <a:rPr lang="en-US" sz="2000" kern="1200" dirty="0"/>
+            <a:rPr lang="en-US" sz="2500" kern="1200" dirty="0"/>
             <a:t>(no data persistence)</a:t>
           </a:r>
         </a:p>
       </dsp:txBody>
       <dsp:txXfrm>
-        <a:off x="55274" y="1146785"/>
-        <a:ext cx="2549426" cy="1492508"/>
+        <a:off x="0" y="950065"/>
+        <a:ext cx="3143249" cy="1885950"/>
       </dsp:txXfrm>
     </dsp:sp>
-    <dsp:sp modelId="{E130B0C0-463D-4C37-A3FD-C40E4CC6E6EF}">
+    <dsp:sp modelId="{2CA9E6A4-8135-4714-8349-841CD368E662}">
       <dsp:nvSpPr>
         <dsp:cNvPr id="0" name=""/>
         <dsp:cNvSpPr/>
       </dsp:nvSpPr>
       <dsp:spPr>
         <a:xfrm>
-          <a:off x="2883656" y="1565395"/>
-          <a:ext cx="560166" cy="655289"/>
+          <a:off x="3457575" y="950065"/>
+          <a:ext cx="3143249" cy="1885950"/>
         </a:xfrm>
-        <a:prstGeom prst="rightArrow">
-          <a:avLst>
-            <a:gd name="adj1" fmla="val 60000"/>
-            <a:gd name="adj2" fmla="val 50000"/>
-          </a:avLst>
-        </a:prstGeom>
-        <a:solidFill>
-          <a:schemeClr val="accent5">
-            <a:hueOff val="0"/>
-            <a:satOff val="0"/>
-            <a:lumOff val="0"/>
-            <a:alphaOff val="0"/>
-          </a:schemeClr>
-        </a:solidFill>
-        <a:ln>
-          <a:noFill/>
-        </a:ln>
-        <a:effectLst/>
-      </dsp:spPr>
-      <dsp:style>
-        <a:lnRef idx="0">
-          <a:scrgbClr r="0" g="0" b="0"/>
-        </a:lnRef>
-        <a:fillRef idx="1">
-          <a:scrgbClr r="0" g="0" b="0"/>
-        </a:fillRef>
-        <a:effectRef idx="0">
-          <a:scrgbClr r="0" g="0" b="0"/>
-        </a:effectRef>
-        <a:fontRef idx="minor">
-          <a:schemeClr val="lt1"/>
-        </a:fontRef>
-      </dsp:style>
-      <dsp:txBody>
-        <a:bodyPr spcFirstLastPara="0" vert="horz" wrap="square" lIns="0" tIns="0" rIns="0" bIns="0" numCol="1" spcCol="1270" anchor="ctr" anchorCtr="0">
-          <a:noAutofit/>
-        </a:bodyPr>
-        <a:lstStyle/>
-        <a:p>
-          <a:pPr marL="0" lvl="0" indent="0" algn="ctr" defTabSz="711200">
-            <a:lnSpc>
-              <a:spcPct val="90000"/>
-            </a:lnSpc>
-            <a:spcBef>
-              <a:spcPct val="0"/>
-            </a:spcBef>
-            <a:spcAft>
-              <a:spcPct val="35000"/>
-            </a:spcAft>
-            <a:buNone/>
-          </a:pPr>
-          <a:endParaRPr lang="en-US" sz="1600" kern="1200"/>
-        </a:p>
-      </dsp:txBody>
-      <dsp:txXfrm>
-        <a:off x="2883656" y="1696453"/>
-        <a:ext cx="392116" cy="393173"/>
-      </dsp:txXfrm>
-    </dsp:sp>
-    <dsp:sp modelId="{AA3CBD35-0917-44A8-B1CA-B1EA3BE07E1C}">
-      <dsp:nvSpPr>
-        <dsp:cNvPr id="0" name=""/>
-        <dsp:cNvSpPr/>
-      </dsp:nvSpPr>
-      <dsp:spPr>
-        <a:xfrm>
-          <a:off x="3708052" y="1100351"/>
-          <a:ext cx="2642294" cy="1585376"/>
-        </a:xfrm>
-        <a:prstGeom prst="roundRect">
-          <a:avLst>
-            <a:gd name="adj" fmla="val 10000"/>
-          </a:avLst>
+        <a:prstGeom prst="rect">
+          <a:avLst/>
         </a:prstGeom>
         <a:solidFill>
           <a:schemeClr val="accent5">
@@ -9009,12 +8922,12 @@
         </a:fontRef>
       </dsp:style>
       <dsp:txBody>
-        <a:bodyPr spcFirstLastPara="0" vert="horz" wrap="square" lIns="76200" tIns="76200" rIns="76200" bIns="76200" numCol="1" spcCol="1270" anchor="ctr" anchorCtr="0">
+        <a:bodyPr spcFirstLastPara="0" vert="horz" wrap="square" lIns="95250" tIns="95250" rIns="95250" bIns="95250" numCol="1" spcCol="1270" anchor="ctr" anchorCtr="0">
           <a:noAutofit/>
         </a:bodyPr>
         <a:lstStyle/>
         <a:p>
-          <a:pPr marL="0" lvl="0" indent="0" algn="ctr" defTabSz="889000">
+          <a:pPr marL="0" lvl="0" indent="0" algn="ctr" defTabSz="1111250">
             <a:lnSpc>
               <a:spcPct val="90000"/>
             </a:lnSpc>
@@ -9028,107 +8941,36 @@
             <a:defRPr cap="all"/>
           </a:pPr>
           <a:r>
-            <a:rPr lang="en-US" sz="2000" kern="1200" dirty="0"/>
+            <a:rPr lang="en-US" sz="2500" kern="1200" dirty="0"/>
             <a:t>Setup node.js server pointing to </a:t>
           </a:r>
           <a:r>
-            <a:rPr lang="en-US" sz="2000" kern="1200" dirty="0" err="1"/>
+            <a:rPr lang="en-US" sz="2500" kern="1200" dirty="0" err="1"/>
             <a:t>db.json</a:t>
           </a:r>
           <a:r>
-            <a:rPr lang="en-US" sz="2000" kern="1200" dirty="0"/>
+            <a:rPr lang="en-US" sz="2500" kern="1200" dirty="0"/>
             <a:t> file</a:t>
           </a:r>
         </a:p>
       </dsp:txBody>
       <dsp:txXfrm>
-        <a:off x="3754486" y="1146785"/>
-        <a:ext cx="2549426" cy="1492508"/>
+        <a:off x="3457575" y="950065"/>
+        <a:ext cx="3143249" cy="1885950"/>
       </dsp:txXfrm>
     </dsp:sp>
-    <dsp:sp modelId="{B2963401-5824-48F0-87B4-9F599222A714}">
+    <dsp:sp modelId="{98F8B0AB-F7F7-432F-8915-0C240C98BD01}">
       <dsp:nvSpPr>
         <dsp:cNvPr id="0" name=""/>
         <dsp:cNvSpPr/>
       </dsp:nvSpPr>
       <dsp:spPr>
         <a:xfrm>
-          <a:off x="6582869" y="1565395"/>
-          <a:ext cx="560166" cy="655289"/>
+          <a:off x="6915149" y="950065"/>
+          <a:ext cx="3143249" cy="1885950"/>
         </a:xfrm>
-        <a:prstGeom prst="rightArrow">
-          <a:avLst>
-            <a:gd name="adj1" fmla="val 60000"/>
-            <a:gd name="adj2" fmla="val 50000"/>
-          </a:avLst>
-        </a:prstGeom>
-        <a:solidFill>
-          <a:schemeClr val="accent5">
-            <a:hueOff val="1603047"/>
-            <a:satOff val="-18876"/>
-            <a:lumOff val="12549"/>
-            <a:alphaOff val="0"/>
-          </a:schemeClr>
-        </a:solidFill>
-        <a:ln>
-          <a:noFill/>
-        </a:ln>
-        <a:effectLst/>
-      </dsp:spPr>
-      <dsp:style>
-        <a:lnRef idx="0">
-          <a:scrgbClr r="0" g="0" b="0"/>
-        </a:lnRef>
-        <a:fillRef idx="1">
-          <a:scrgbClr r="0" g="0" b="0"/>
-        </a:fillRef>
-        <a:effectRef idx="0">
-          <a:scrgbClr r="0" g="0" b="0"/>
-        </a:effectRef>
-        <a:fontRef idx="minor">
-          <a:schemeClr val="lt1"/>
-        </a:fontRef>
-      </dsp:style>
-      <dsp:txBody>
-        <a:bodyPr spcFirstLastPara="0" vert="horz" wrap="square" lIns="0" tIns="0" rIns="0" bIns="0" numCol="1" spcCol="1270" anchor="ctr" anchorCtr="0">
-          <a:noAutofit/>
-        </a:bodyPr>
-        <a:lstStyle/>
-        <a:p>
-          <a:pPr marL="0" lvl="0" indent="0" algn="ctr" defTabSz="711200">
-            <a:lnSpc>
-              <a:spcPct val="90000"/>
-            </a:lnSpc>
-            <a:spcBef>
-              <a:spcPct val="0"/>
-            </a:spcBef>
-            <a:spcAft>
-              <a:spcPct val="35000"/>
-            </a:spcAft>
-            <a:buNone/>
-          </a:pPr>
-          <a:endParaRPr lang="en-US" sz="1600" kern="1200"/>
-        </a:p>
-      </dsp:txBody>
-      <dsp:txXfrm>
-        <a:off x="6582869" y="1696453"/>
-        <a:ext cx="392116" cy="393173"/>
-      </dsp:txXfrm>
-    </dsp:sp>
-    <dsp:sp modelId="{2B94F1A7-76E2-4051-A8E5-FE9E5E521038}">
-      <dsp:nvSpPr>
-        <dsp:cNvPr id="0" name=""/>
-        <dsp:cNvSpPr/>
-      </dsp:nvSpPr>
-      <dsp:spPr>
-        <a:xfrm>
-          <a:off x="7407265" y="1100351"/>
-          <a:ext cx="2642294" cy="1585376"/>
-        </a:xfrm>
-        <a:prstGeom prst="roundRect">
-          <a:avLst>
-            <a:gd name="adj" fmla="val 10000"/>
-          </a:avLst>
+        <a:prstGeom prst="rect">
+          <a:avLst/>
         </a:prstGeom>
         <a:solidFill>
           <a:schemeClr val="accent5">
@@ -9166,12 +9008,12 @@
         </a:fontRef>
       </dsp:style>
       <dsp:txBody>
-        <a:bodyPr spcFirstLastPara="0" vert="horz" wrap="square" lIns="76200" tIns="76200" rIns="76200" bIns="76200" numCol="1" spcCol="1270" anchor="ctr" anchorCtr="0">
+        <a:bodyPr spcFirstLastPara="0" vert="horz" wrap="square" lIns="95250" tIns="95250" rIns="95250" bIns="95250" numCol="1" spcCol="1270" anchor="ctr" anchorCtr="0">
           <a:noAutofit/>
         </a:bodyPr>
         <a:lstStyle/>
         <a:p>
-          <a:pPr marL="0" lvl="0" indent="0" algn="ctr" defTabSz="889000">
+          <a:pPr marL="0" lvl="0" indent="0" algn="ctr" defTabSz="1111250">
             <a:lnSpc>
               <a:spcPct val="90000"/>
             </a:lnSpc>
@@ -9184,14 +9026,14 @@
             <a:buNone/>
           </a:pPr>
           <a:r>
-            <a:rPr lang="en-US" sz="2000" kern="1200" dirty="0"/>
+            <a:rPr lang="en-US" sz="2500" kern="1200" dirty="0"/>
             <a:t>CRUD WITH FETCHES TO SERVER’S DB.JSON FILE FOR DATA PERSISTENCE</a:t>
           </a:r>
         </a:p>
       </dsp:txBody>
       <dsp:txXfrm>
-        <a:off x="7453699" y="1146785"/>
-        <a:ext cx="2549426" cy="1492508"/>
+        <a:off x="6915149" y="950065"/>
+        <a:ext cx="3143249" cy="1885950"/>
       </dsp:txXfrm>
     </dsp:sp>
   </dsp:spTree>
@@ -11268,11 +11110,11 @@
 </file>
 
 <file path=ppt/diagrams/layout3.xml><?xml version="1.0" encoding="utf-8"?>
-<dgm:layoutDef xmlns:dgm="http://schemas.openxmlformats.org/drawingml/2006/diagram" xmlns:a="http://schemas.openxmlformats.org/drawingml/2006/main" uniqueId="urn:microsoft.com/office/officeart/2005/8/layout/process5">
+<dgm:layoutDef xmlns:dgm="http://schemas.openxmlformats.org/drawingml/2006/diagram" xmlns:a="http://schemas.openxmlformats.org/drawingml/2006/main" uniqueId="urn:microsoft.com/office/officeart/2005/8/layout/default">
   <dgm:title val=""/>
   <dgm:desc val=""/>
   <dgm:catLst>
-    <dgm:cat type="process" pri="17000"/>
+    <dgm:cat type="list" pri="400"/>
   </dgm:catLst>
   <dgm:sampData>
     <dgm:dataModel>
@@ -11295,11 +11137,11 @@
         </dgm:pt>
       </dgm:ptLst>
       <dgm:cxnLst>
-        <dgm:cxn modelId="7" srcId="0" destId="1" srcOrd="0" destOrd="0"/>
-        <dgm:cxn modelId="8" srcId="0" destId="2" srcOrd="1" destOrd="0"/>
-        <dgm:cxn modelId="9" srcId="0" destId="3" srcOrd="2" destOrd="0"/>
-        <dgm:cxn modelId="10" srcId="0" destId="4" srcOrd="3" destOrd="0"/>
-        <dgm:cxn modelId="11" srcId="0" destId="5" srcOrd="4" destOrd="0"/>
+        <dgm:cxn modelId="6" srcId="0" destId="1" srcOrd="0" destOrd="0"/>
+        <dgm:cxn modelId="7" srcId="0" destId="2" srcOrd="1" destOrd="0"/>
+        <dgm:cxn modelId="8" srcId="0" destId="3" srcOrd="2" destOrd="0"/>
+        <dgm:cxn modelId="9" srcId="0" destId="4" srcOrd="3" destOrd="0"/>
+        <dgm:cxn modelId="10" srcId="0" destId="5" srcOrd="4" destOrd="0"/>
       </dgm:cxnLst>
       <dgm:bg/>
       <dgm:whole/>
@@ -11328,12 +11170,16 @@
         <dgm:pt modelId="2"/>
         <dgm:pt modelId="3"/>
         <dgm:pt modelId="4"/>
+        <dgm:pt modelId="5"/>
+        <dgm:pt modelId="6"/>
       </dgm:ptLst>
       <dgm:cxnLst>
-        <dgm:cxn modelId="5" srcId="0" destId="1" srcOrd="0" destOrd="0"/>
-        <dgm:cxn modelId="6" srcId="0" destId="2" srcOrd="1" destOrd="0"/>
-        <dgm:cxn modelId="7" srcId="0" destId="3" srcOrd="2" destOrd="0"/>
-        <dgm:cxn modelId="8" srcId="0" destId="4" srcOrd="3" destOrd="0"/>
+        <dgm:cxn modelId="7" srcId="0" destId="1" srcOrd="0" destOrd="0"/>
+        <dgm:cxn modelId="8" srcId="0" destId="2" srcOrd="1" destOrd="0"/>
+        <dgm:cxn modelId="9" srcId="0" destId="3" srcOrd="2" destOrd="0"/>
+        <dgm:cxn modelId="10" srcId="0" destId="4" srcOrd="3" destOrd="0"/>
+        <dgm:cxn modelId="11" srcId="0" destId="5" srcOrd="4" destOrd="0"/>
+        <dgm:cxn modelId="12" srcId="0" destId="6" srcOrd="5" destOrd="0"/>
       </dgm:cxnLst>
       <dgm:bg/>
       <dgm:whole/>
@@ -11345,20 +11191,20 @@
       <dgm:resizeHandles val="exact"/>
     </dgm:varLst>
     <dgm:choose name="Name0">
-      <dgm:if name="Name1" axis="self" func="var" arg="dir" op="equ" val="norm">
+      <dgm:if name="Name1" func="var" arg="dir" op="equ" val="norm">
         <dgm:alg type="snake">
           <dgm:param type="grDir" val="tL"/>
           <dgm:param type="flowDir" val="row"/>
-          <dgm:param type="contDir" val="revDir"/>
-          <dgm:param type="bkpt" val="endCnv"/>
+          <dgm:param type="contDir" val="sameDir"/>
+          <dgm:param type="off" val="ctr"/>
         </dgm:alg>
       </dgm:if>
       <dgm:else name="Name2">
         <dgm:alg type="snake">
           <dgm:param type="grDir" val="tR"/>
           <dgm:param type="flowDir" val="row"/>
-          <dgm:param type="contDir" val="revDir"/>
-          <dgm:param type="bkpt" val="endCnv"/>
+          <dgm:param type="contDir" val="sameDir"/>
+          <dgm:param type="off" val="ctr"/>
         </dgm:alg>
       </dgm:else>
     </dgm:choose>
@@ -11367,70 +11213,42 @@
     </dgm:shape>
     <dgm:presOf/>
     <dgm:constrLst>
-      <dgm:constr type="w" for="ch" ptType="node" refType="w"/>
-      <dgm:constr type="w" for="ch" forName="sibTrans" refType="w" refFor="ch" refPtType="node" op="equ" fact="0.4"/>
-      <dgm:constr type="sp" refType="w" refFor="ch" refForName="sibTrans" op="equ"/>
-      <dgm:constr type="primFontSz" for="ch" ptType="node" op="equ" val="65"/>
-      <dgm:constr type="primFontSz" for="des" forName="connectorText" op="equ" val="55"/>
-      <dgm:constr type="primFontSz" for="des" forName="connectorText" refType="primFontSz" refFor="ch" refPtType="node" op="lte" fact="0.8"/>
+      <dgm:constr type="w" for="ch" forName="node" refType="w"/>
+      <dgm:constr type="h" for="ch" forName="node" refType="w" refFor="ch" refForName="node" fact="0.6"/>
+      <dgm:constr type="w" for="ch" forName="sibTrans" refType="w" refFor="ch" refForName="node" fact="0.1"/>
+      <dgm:constr type="sp" refType="w" refFor="ch" refForName="sibTrans"/>
+      <dgm:constr type="primFontSz" for="ch" forName="node" op="equ" val="65"/>
     </dgm:constrLst>
     <dgm:ruleLst/>
-    <dgm:forEach name="nodesForEach" axis="ch" ptType="node">
+    <dgm:forEach name="Name3" axis="ch" ptType="node">
       <dgm:layoutNode name="node">
         <dgm:varLst>
           <dgm:bulletEnabled val="1"/>
         </dgm:varLst>
         <dgm:alg type="tx"/>
-        <dgm:shape xmlns:r="http://schemas.openxmlformats.org/officeDocument/2006/relationships" type="roundRect" r:blip="">
-          <dgm:adjLst>
-            <dgm:adj idx="1" val="0.1"/>
-          </dgm:adjLst>
+        <dgm:shape xmlns:r="http://schemas.openxmlformats.org/officeDocument/2006/relationships" type="rect" r:blip="">
+          <dgm:adjLst/>
         </dgm:shape>
         <dgm:presOf axis="desOrSelf" ptType="node"/>
         <dgm:constrLst>
-          <dgm:constr type="h" refType="w" fact="0.6"/>
+          <dgm:constr type="lMarg" refType="primFontSz" fact="0.3"/>
+          <dgm:constr type="rMarg" refType="primFontSz" fact="0.3"/>
           <dgm:constr type="tMarg" refType="primFontSz" fact="0.3"/>
           <dgm:constr type="bMarg" refType="primFontSz" fact="0.3"/>
-          <dgm:constr type="lMarg" refType="primFontSz" fact="0.3"/>
-          <dgm:constr type="rMarg" refType="primFontSz" fact="0.3"/>
         </dgm:constrLst>
         <dgm:ruleLst>
           <dgm:rule type="primFontSz" val="5" fact="NaN" max="NaN"/>
         </dgm:ruleLst>
       </dgm:layoutNode>
-      <dgm:forEach name="sibTransForEach" axis="followSib" ptType="sibTrans" cnt="1">
+      <dgm:forEach name="Name4" axis="followSib" ptType="sibTrans" cnt="1">
         <dgm:layoutNode name="sibTrans">
-          <dgm:alg type="conn">
-            <dgm:param type="begPts" val="auto"/>
-            <dgm:param type="endPts" val="auto"/>
-          </dgm:alg>
-          <dgm:shape xmlns:r="http://schemas.openxmlformats.org/officeDocument/2006/relationships" type="conn" r:blip="">
+          <dgm:alg type="sp"/>
+          <dgm:shape xmlns:r="http://schemas.openxmlformats.org/officeDocument/2006/relationships" r:blip="">
             <dgm:adjLst/>
           </dgm:shape>
-          <dgm:presOf axis="self"/>
-          <dgm:constrLst>
-            <dgm:constr type="h" refType="w" fact="0.62"/>
-            <dgm:constr type="connDist"/>
-          </dgm:constrLst>
+          <dgm:presOf/>
+          <dgm:constrLst/>
           <dgm:ruleLst/>
-          <dgm:layoutNode name="connectorText">
-            <dgm:alg type="tx">
-              <dgm:param type="autoTxRot" val="upr"/>
-            </dgm:alg>
-            <dgm:shape xmlns:r="http://schemas.openxmlformats.org/officeDocument/2006/relationships" type="conn" r:blip="" hideGeom="1">
-              <dgm:adjLst/>
-            </dgm:shape>
-            <dgm:presOf axis="self"/>
-            <dgm:constrLst>
-              <dgm:constr type="lMarg"/>
-              <dgm:constr type="rMarg"/>
-              <dgm:constr type="tMarg"/>
-              <dgm:constr type="bMarg"/>
-            </dgm:constrLst>
-            <dgm:ruleLst>
-              <dgm:rule type="primFontSz" val="5" fact="NaN" max="NaN"/>
-            </dgm:ruleLst>
-          </dgm:layoutNode>
         </dgm:layoutNode>
       </dgm:forEach>
     </dgm:forEach>
@@ -20045,7 +19863,7 @@
           <a:p>
             <a:fld id="{9184DA70-C731-4C70-880D-CCD4705E623C}" type="datetime1">
               <a:rPr lang="en-US" smtClean="0"/>
-              <a:t>4/24/2022</a:t>
+              <a:t>4/25/2022</a:t>
             </a:fld>
             <a:endParaRPr lang="en-US" dirty="0"/>
           </a:p>
@@ -20343,7 +20161,7 @@
           <a:p>
             <a:fld id="{62D6E202-B606-4609-B914-27C9371A1F6D}" type="datetime1">
               <a:rPr lang="en-US" smtClean="0"/>
-              <a:t>4/24/2022</a:t>
+              <a:t>4/25/2022</a:t>
             </a:fld>
             <a:endParaRPr lang="en-US" dirty="0"/>
           </a:p>
@@ -20536,7 +20354,7 @@
           <a:p>
             <a:fld id="{62D6E202-B606-4609-B914-27C9371A1F6D}" type="datetime1">
               <a:rPr lang="en-US" smtClean="0"/>
-              <a:t>4/24/2022</a:t>
+              <a:t>4/25/2022</a:t>
             </a:fld>
             <a:endParaRPr lang="en-US" dirty="0"/>
           </a:p>
@@ -20798,7 +20616,7 @@
           <a:p>
             <a:fld id="{62D6E202-B606-4609-B914-27C9371A1F6D}" type="datetime1">
               <a:rPr lang="en-US" smtClean="0"/>
-              <a:t>4/24/2022</a:t>
+              <a:t>4/25/2022</a:t>
             </a:fld>
             <a:endParaRPr lang="en-US" dirty="0"/>
           </a:p>
@@ -21223,7 +21041,7 @@
           <a:p>
             <a:fld id="{62D6E202-B606-4609-B914-27C9371A1F6D}" type="datetime1">
               <a:rPr lang="en-US" smtClean="0"/>
-              <a:t>4/24/2022</a:t>
+              <a:t>4/25/2022</a:t>
             </a:fld>
             <a:endParaRPr lang="en-US" dirty="0"/>
           </a:p>
@@ -21761,7 +21579,7 @@
           <a:p>
             <a:fld id="{62D6E202-B606-4609-B914-27C9371A1F6D}" type="datetime1">
               <a:rPr lang="en-US" smtClean="0"/>
-              <a:t>4/24/2022</a:t>
+              <a:t>4/25/2022</a:t>
             </a:fld>
             <a:endParaRPr lang="en-US" dirty="0"/>
           </a:p>
@@ -22626,7 +22444,7 @@
           <a:p>
             <a:fld id="{62D6E202-B606-4609-B914-27C9371A1F6D}" type="datetime1">
               <a:rPr lang="en-US" smtClean="0"/>
-              <a:t>4/24/2022</a:t>
+              <a:t>4/25/2022</a:t>
             </a:fld>
             <a:endParaRPr lang="en-US" dirty="0"/>
           </a:p>
@@ -22797,7 +22615,7 @@
           <a:p>
             <a:fld id="{62D6E202-B606-4609-B914-27C9371A1F6D}" type="datetime1">
               <a:rPr lang="en-US" smtClean="0"/>
-              <a:t>4/24/2022</a:t>
+              <a:t>4/25/2022</a:t>
             </a:fld>
             <a:endParaRPr lang="en-US" dirty="0"/>
           </a:p>
@@ -22982,7 +22800,7 @@
           <a:p>
             <a:fld id="{62D6E202-B606-4609-B914-27C9371A1F6D}" type="datetime1">
               <a:rPr lang="en-US" smtClean="0"/>
-              <a:t>4/24/2022</a:t>
+              <a:t>4/25/2022</a:t>
             </a:fld>
             <a:endParaRPr lang="en-US" dirty="0"/>
           </a:p>
@@ -23153,7 +22971,7 @@
           <a:p>
             <a:fld id="{4BE1D723-8F53-4F53-90B0-1982A396982E}" type="datetime1">
               <a:rPr lang="en-US" smtClean="0"/>
-              <a:t>4/24/2022</a:t>
+              <a:t>4/25/2022</a:t>
             </a:fld>
             <a:endParaRPr lang="en-US" dirty="0"/>
           </a:p>
@@ -23397,7 +23215,7 @@
           <a:p>
             <a:fld id="{97669AF7-7BEB-44E4-9852-375E34362B5B}" type="datetime1">
               <a:rPr lang="en-US" smtClean="0"/>
-              <a:t>4/24/2022</a:t>
+              <a:t>4/25/2022</a:t>
             </a:fld>
             <a:endParaRPr lang="en-US" dirty="0"/>
           </a:p>
@@ -23633,7 +23451,7 @@
           <a:p>
             <a:fld id="{BAAAC38D-0552-4C82-B593-E6124DFADBE2}" type="datetime1">
               <a:rPr lang="en-US" smtClean="0"/>
-              <a:t>4/24/2022</a:t>
+              <a:t>4/25/2022</a:t>
             </a:fld>
             <a:endParaRPr lang="en-US" dirty="0"/>
           </a:p>
@@ -24099,7 +23917,7 @@
           <a:p>
             <a:fld id="{D9DF0F1C-5577-4ACB-BB62-DF8F3C494C7E}" type="datetime1">
               <a:rPr lang="en-US" smtClean="0"/>
-              <a:t>4/24/2022</a:t>
+              <a:t>4/25/2022</a:t>
             </a:fld>
             <a:endParaRPr lang="en-US" dirty="0"/>
           </a:p>
@@ -24217,7 +24035,7 @@
           <a:p>
             <a:fld id="{1775B394-D9F9-4F0C-B15D-605F45CB9E9F}" type="datetime1">
               <a:rPr lang="en-US" smtClean="0"/>
-              <a:t>4/24/2022</a:t>
+              <a:t>4/25/2022</a:t>
             </a:fld>
             <a:endParaRPr lang="en-US" dirty="0"/>
           </a:p>
@@ -24312,7 +24130,7 @@
           <a:p>
             <a:fld id="{39667345-2558-425A-8533-9BFDBCE15005}" type="datetime1">
               <a:rPr lang="en-US" smtClean="0"/>
-              <a:t>4/24/2022</a:t>
+              <a:t>4/25/2022</a:t>
             </a:fld>
             <a:endParaRPr lang="en-US" dirty="0"/>
           </a:p>
@@ -24567,7 +24385,7 @@
           <a:p>
             <a:fld id="{92BEA474-078D-4E9B-9B14-09A87B19DC46}" type="datetime1">
               <a:rPr lang="en-US" smtClean="0"/>
-              <a:t>4/24/2022</a:t>
+              <a:t>4/25/2022</a:t>
             </a:fld>
             <a:endParaRPr lang="en-US" dirty="0"/>
           </a:p>
@@ -24868,7 +24686,7 @@
           <a:p>
             <a:fld id="{4907D986-8816-4272-A432-0437A28A9828}" type="datetime1">
               <a:rPr lang="en-US" smtClean="0"/>
-              <a:t>4/24/2022</a:t>
+              <a:t>4/25/2022</a:t>
             </a:fld>
             <a:endParaRPr lang="en-US" dirty="0"/>
           </a:p>
@@ -25103,7 +24921,7 @@
           <a:p>
             <a:fld id="{62D6E202-B606-4609-B914-27C9371A1F6D}" type="datetime1">
               <a:rPr lang="en-US" smtClean="0"/>
-              <a:t>4/24/2022</a:t>
+              <a:t>4/25/2022</a:t>
             </a:fld>
             <a:endParaRPr lang="en-US" dirty="0"/>
           </a:p>
@@ -25815,13 +25633,10 @@
           <a:lstStyle/>
           <a:p>
             <a:r>
-              <a:rPr lang="en-US" sz="7200" dirty="0" err="1"/>
-              <a:t>TeamStats</a:t>
+              <a:rPr lang="en-US" sz="7200"/>
+              <a:t>TeamStats: Soccer Edition</a:t>
             </a:r>
-            <a:r>
-              <a:rPr lang="en-US" sz="7200" dirty="0"/>
-              <a:t>: Soccer Edition</a:t>
-            </a:r>
+            <a:endParaRPr lang="en-US" sz="7200" dirty="0"/>
           </a:p>
         </p:txBody>
       </p:sp>
@@ -25854,32 +25669,19 @@
           <a:lstStyle/>
           <a:p>
             <a:r>
-              <a:rPr lang="en-US" sz="2400" dirty="0"/>
-              <a:t>Mac </a:t>
-            </a:r>
-            <a:r>
-              <a:rPr lang="en-US" sz="2400" dirty="0" err="1"/>
-              <a:t>Staloch</a:t>
-            </a:r>
-            <a:r>
-              <a:rPr lang="en-US" sz="2400" dirty="0"/>
-              <a:t>, Eric Wang,</a:t>
+              <a:rPr lang="en-US" sz="2400"/>
+              <a:t>Mac Staloch, Eric Wang,</a:t>
             </a:r>
           </a:p>
           <a:p>
             <a:r>
-              <a:rPr lang="en-US" sz="2400" dirty="0"/>
-              <a:t> &amp; Robert </a:t>
+              <a:rPr lang="en-US" sz="2400"/>
+              <a:t> &amp; Robert Xie</a:t>
             </a:r>
-            <a:r>
-              <a:rPr lang="en-US" sz="2400" dirty="0" err="1"/>
-              <a:t>Xie</a:t>
-            </a:r>
-            <a:endParaRPr lang="en-US" sz="2400" dirty="0"/>
           </a:p>
           <a:p>
             <a:r>
-              <a:rPr lang="en-US" sz="1600" dirty="0"/>
+              <a:rPr lang="en-US" sz="1600"/>
               <a:t>COMP 324: Final Project (Spring 2022)</a:t>
             </a:r>
             <a:endParaRPr lang="en-US" sz="1400" dirty="0"/>
@@ -25888,13 +25690,10 @@
       </p:sp>
       <p:pic>
         <p:nvPicPr>
-          <p:cNvPr id="7" name="Picture 6">
+          <p:cNvPr id="8" name="Picture 7" descr="A football ball on a field&#10;&#10;Description automatically generated with low confidence">
             <a:extLst>
               <a:ext uri="{FF2B5EF4-FFF2-40B4-BE49-F238E27FC236}">
-                <a16:creationId xmlns:a16="http://schemas.microsoft.com/office/drawing/2014/main" id="{EA84C7EF-4FB9-4D51-B735-74D2A91E3531}"/>
-              </a:ext>
-              <a:ext uri="{C183D7F6-B498-43B3-948B-1728B52AA6E4}">
-                <adec:decorative xmlns:adec="http://schemas.microsoft.com/office/drawing/2017/decorative" val="1"/>
+                <a16:creationId xmlns:a16="http://schemas.microsoft.com/office/drawing/2014/main" id="{4545CDB7-04A5-4BCC-AEEF-6AF0E247D0F0}"/>
               </a:ext>
             </a:extLst>
           </p:cNvPr>
@@ -25905,13 +25704,14 @@
         </p:nvPicPr>
         <p:blipFill>
           <a:blip r:embed="rId2"/>
-          <a:srcRect/>
-          <a:stretch/>
+          <a:stretch>
+            <a:fillRect/>
+          </a:stretch>
         </p:blipFill>
         <p:spPr>
           <a:xfrm>
-            <a:off x="634000" y="1713481"/>
-            <a:ext cx="6096000" cy="3431037"/>
+            <a:off x="1094895" y="1844127"/>
+            <a:ext cx="5635104" cy="3169746"/>
           </a:xfrm>
           <a:prstGeom prst="rect">
             <a:avLst/>
@@ -26212,7 +26012,7 @@
             <p:ph idx="1"/>
             <p:extLst>
               <p:ext uri="{D42A27DB-BD31-4B8C-83A1-F6EECF244321}">
-                <p14:modId xmlns:p14="http://schemas.microsoft.com/office/powerpoint/2010/main" val="1075292150"/>
+                <p14:modId xmlns:p14="http://schemas.microsoft.com/office/powerpoint/2010/main" val="3805241320"/>
               </p:ext>
             </p:extLst>
           </p:nvPr>
@@ -26304,6 +26104,36 @@
           </a:p>
         </p:txBody>
       </p:sp>
+      <p:pic>
+        <p:nvPicPr>
+          <p:cNvPr id="6" name="Picture 5" descr="Icon&#10;&#10;Description automatically generated">
+            <a:extLst>
+              <a:ext uri="{FF2B5EF4-FFF2-40B4-BE49-F238E27FC236}">
+                <a16:creationId xmlns:a16="http://schemas.microsoft.com/office/drawing/2014/main" id="{1CC598A1-1E90-4221-89E9-B020BEFF5D6F}"/>
+              </a:ext>
+            </a:extLst>
+          </p:cNvPr>
+          <p:cNvPicPr>
+            <a:picLocks noChangeAspect="1"/>
+          </p:cNvPicPr>
+          <p:nvPr/>
+        </p:nvPicPr>
+        <p:blipFill>
+          <a:blip r:embed="rId9"/>
+          <a:stretch>
+            <a:fillRect/>
+          </a:stretch>
+        </p:blipFill>
+        <p:spPr>
+          <a:xfrm>
+            <a:off x="10545763" y="5274995"/>
+            <a:ext cx="1219200" cy="1219200"/>
+          </a:xfrm>
+          <a:prstGeom prst="rect">
+            <a:avLst/>
+          </a:prstGeom>
+        </p:spPr>
+      </p:pic>
     </p:spTree>
     <p:extLst>
       <p:ext uri="{BB962C8B-B14F-4D97-AF65-F5344CB8AC3E}">
@@ -26427,75 +26257,6 @@
           </a:graphicData>
         </a:graphic>
       </p:graphicFrame>
-      <p:sp>
-        <p:nvSpPr>
-          <p:cNvPr id="3" name="TextBox 2">
-            <a:extLst>
-              <a:ext uri="{FF2B5EF4-FFF2-40B4-BE49-F238E27FC236}">
-                <a16:creationId xmlns:a16="http://schemas.microsoft.com/office/drawing/2014/main" id="{29D3333B-63DA-4BC0-8E3D-7F3FB464EC16}"/>
-              </a:ext>
-            </a:extLst>
-          </p:cNvPr>
-          <p:cNvSpPr txBox="1"/>
-          <p:nvPr/>
-        </p:nvSpPr>
-        <p:spPr>
-          <a:xfrm>
-            <a:off x="2142563" y="5943113"/>
-            <a:ext cx="7896225" cy="369332"/>
-          </a:xfrm>
-          <a:prstGeom prst="rect">
-            <a:avLst/>
-          </a:prstGeom>
-          <a:noFill/>
-        </p:spPr>
-        <p:txBody>
-          <a:bodyPr wrap="square" rtlCol="0">
-            <a:spAutoFit/>
-          </a:bodyPr>
-          <a:lstStyle/>
-          <a:p>
-            <a:r>
-              <a:rPr lang="en-US" dirty="0" err="1"/>
-              <a:t>db.json</a:t>
-            </a:r>
-            <a:r>
-              <a:rPr lang="en-US" dirty="0"/>
-              <a:t> file retrieval testing with custom API utilized Postman</a:t>
-            </a:r>
-          </a:p>
-        </p:txBody>
-      </p:sp>
-      <p:pic>
-        <p:nvPicPr>
-          <p:cNvPr id="6" name="Picture 5">
-            <a:extLst>
-              <a:ext uri="{FF2B5EF4-FFF2-40B4-BE49-F238E27FC236}">
-                <a16:creationId xmlns:a16="http://schemas.microsoft.com/office/drawing/2014/main" id="{539A4148-12ED-4E6B-90E9-677811DB0616}"/>
-              </a:ext>
-            </a:extLst>
-          </p:cNvPr>
-          <p:cNvPicPr>
-            <a:picLocks noChangeAspect="1"/>
-          </p:cNvPicPr>
-          <p:nvPr/>
-        </p:nvPicPr>
-        <p:blipFill>
-          <a:blip r:embed="rId8"/>
-          <a:stretch>
-            <a:fillRect/>
-          </a:stretch>
-        </p:blipFill>
-        <p:spPr>
-          <a:xfrm>
-            <a:off x="9429188" y="5333513"/>
-            <a:ext cx="1219200" cy="1219200"/>
-          </a:xfrm>
-          <a:prstGeom prst="rect">
-            <a:avLst/>
-          </a:prstGeom>
-        </p:spPr>
-      </p:pic>
     </p:spTree>
     <p:extLst>
       <p:ext uri="{BB962C8B-B14F-4D97-AF65-F5344CB8AC3E}">
@@ -26793,170 +26554,6 @@
 <file path=ppt/slides/slide8.xml><?xml version="1.0" encoding="utf-8"?>
 <p:sld xmlns:a="http://schemas.openxmlformats.org/drawingml/2006/main" xmlns:r="http://schemas.openxmlformats.org/officeDocument/2006/relationships" xmlns:p="http://schemas.openxmlformats.org/presentationml/2006/main">
   <p:cSld>
-    <p:bg>
-      <p:bgPr>
-        <a:blipFill rotWithShape="1">
-          <a:blip r:embed="rId2">
-            <a:duotone>
-              <a:schemeClr val="bg2">
-                <a:shade val="80000"/>
-                <a:lumMod val="80000"/>
-              </a:schemeClr>
-              <a:schemeClr val="bg2">
-                <a:tint val="98000"/>
-              </a:schemeClr>
-            </a:duotone>
-          </a:blip>
-          <a:stretch/>
-        </a:blipFill>
-        <a:effectLst/>
-      </p:bgPr>
-    </p:bg>
-    <p:spTree>
-      <p:nvGrpSpPr>
-        <p:cNvPr id="1" name=""/>
-        <p:cNvGrpSpPr/>
-        <p:nvPr/>
-      </p:nvGrpSpPr>
-      <p:grpSpPr>
-        <a:xfrm>
-          <a:off x="0" y="0"/>
-          <a:ext cx="0" cy="0"/>
-          <a:chOff x="0" y="0"/>
-          <a:chExt cx="0" cy="0"/>
-        </a:xfrm>
-      </p:grpSpPr>
-      <p:sp>
-        <p:nvSpPr>
-          <p:cNvPr id="2" name="Title 1">
-            <a:extLst>
-              <a:ext uri="{FF2B5EF4-FFF2-40B4-BE49-F238E27FC236}">
-                <a16:creationId xmlns:a16="http://schemas.microsoft.com/office/drawing/2014/main" id="{66A47F5C-50EC-416A-AE8C-6F6BB4225673}"/>
-              </a:ext>
-            </a:extLst>
-          </p:cNvPr>
-          <p:cNvSpPr>
-            <a:spLocks noGrp="1"/>
-          </p:cNvSpPr>
-          <p:nvPr>
-            <p:ph type="title"/>
-          </p:nvPr>
-        </p:nvSpPr>
-        <p:spPr>
-          <a:xfrm>
-            <a:off x="633743" y="609599"/>
-            <a:ext cx="3413156" cy="5273675"/>
-          </a:xfrm>
-        </p:spPr>
-        <p:txBody>
-          <a:bodyPr>
-            <a:normAutofit/>
-          </a:bodyPr>
-          <a:lstStyle/>
-          <a:p>
-            <a:r>
-              <a:rPr lang="en-US" dirty="0" err="1"/>
-              <a:t>TeamStats</a:t>
-            </a:r>
-            <a:r>
-              <a:rPr lang="en-US" dirty="0"/>
-              <a:t>: Design &amp; Patterns</a:t>
-            </a:r>
-          </a:p>
-        </p:txBody>
-      </p:sp>
-      <p:pic>
-        <p:nvPicPr>
-          <p:cNvPr id="9" name="Picture 8">
-            <a:extLst>
-              <a:ext uri="{FF2B5EF4-FFF2-40B4-BE49-F238E27FC236}">
-                <a16:creationId xmlns:a16="http://schemas.microsoft.com/office/drawing/2014/main" id="{B577D423-FE81-4236-89DE-39776B810941}"/>
-              </a:ext>
-              <a:ext uri="{C183D7F6-B498-43B3-948B-1728B52AA6E4}">
-                <adec:decorative xmlns:adec="http://schemas.microsoft.com/office/drawing/2017/decorative" val="1"/>
-              </a:ext>
-            </a:extLst>
-          </p:cNvPr>
-          <p:cNvPicPr>
-            <a:picLocks noGrp="1" noRot="1" noChangeAspect="1" noMove="1" noResize="1" noEditPoints="1" noAdjustHandles="1" noChangeArrowheads="1" noChangeShapeType="1" noCrop="1"/>
-          </p:cNvPicPr>
-          <p:nvPr>
-            <p:extLst>
-              <p:ext uri="{386F3935-93C4-4BCD-93E2-E3B085C9AB24}">
-                <p16:designElem xmlns:p16="http://schemas.microsoft.com/office/powerpoint/2015/main" val="1"/>
-              </p:ext>
-            </p:extLst>
-          </p:nvPr>
-        </p:nvPicPr>
-        <p:blipFill>
-          <a:blip r:embed="rId3">
-            <a:extLst>
-              <a:ext uri="{28A0092B-C50C-407E-A947-70E740481C1C}">
-                <a14:useLocalDpi xmlns:a14="http://schemas.microsoft.com/office/drawing/2010/main" val="0"/>
-              </a:ext>
-            </a:extLst>
-          </a:blip>
-          <a:stretch>
-            <a:fillRect/>
-          </a:stretch>
-        </p:blipFill>
-        <p:spPr>
-          <a:xfrm>
-            <a:off x="4680641" y="609599"/>
-            <a:ext cx="6889687" cy="5273675"/>
-          </a:xfrm>
-          <a:prstGeom prst="rect">
-            <a:avLst/>
-          </a:prstGeom>
-        </p:spPr>
-      </p:pic>
-      <p:graphicFrame>
-        <p:nvGraphicFramePr>
-          <p:cNvPr id="4" name="Content Placeholder 2" descr="SmartArt graphic">
-            <a:extLst>
-              <a:ext uri="{FF2B5EF4-FFF2-40B4-BE49-F238E27FC236}">
-                <a16:creationId xmlns:a16="http://schemas.microsoft.com/office/drawing/2014/main" id="{59F5A1AC-D08D-42AE-B94A-1CAFB517D846}"/>
-              </a:ext>
-            </a:extLst>
-          </p:cNvPr>
-          <p:cNvGraphicFramePr>
-            <a:graphicFrameLocks noGrp="1"/>
-          </p:cNvGraphicFramePr>
-          <p:nvPr>
-            <p:ph idx="1"/>
-            <p:extLst>
-              <p:ext uri="{D42A27DB-BD31-4B8C-83A1-F6EECF244321}">
-                <p14:modId xmlns:p14="http://schemas.microsoft.com/office/powerpoint/2010/main" val="3260550571"/>
-              </p:ext>
-            </p:extLst>
-          </p:nvPr>
-        </p:nvGraphicFramePr>
-        <p:xfrm>
-          <a:off x="4958257" y="887213"/>
-          <a:ext cx="6309300" cy="4718448"/>
-        </p:xfrm>
-        <a:graphic>
-          <a:graphicData uri="http://schemas.openxmlformats.org/drawingml/2006/diagram">
-            <dgm:relIds xmlns:dgm="http://schemas.openxmlformats.org/drawingml/2006/diagram" xmlns:r="http://schemas.openxmlformats.org/officeDocument/2006/relationships" r:dm="rId4" r:lo="rId5" r:qs="rId6" r:cs="rId7"/>
-          </a:graphicData>
-        </a:graphic>
-      </p:graphicFrame>
-    </p:spTree>
-    <p:extLst>
-      <p:ext uri="{BB962C8B-B14F-4D97-AF65-F5344CB8AC3E}">
-        <p14:creationId xmlns:p14="http://schemas.microsoft.com/office/powerpoint/2010/main" val="3012861598"/>
-      </p:ext>
-    </p:extLst>
-  </p:cSld>
-  <p:clrMapOvr>
-    <a:masterClrMapping/>
-  </p:clrMapOvr>
-</p:sld>
-</file>
-
-<file path=ppt/slides/slide9.xml><?xml version="1.0" encoding="utf-8"?>
-<p:sld xmlns:a="http://schemas.openxmlformats.org/drawingml/2006/main" xmlns:r="http://schemas.openxmlformats.org/officeDocument/2006/relationships" xmlns:p="http://schemas.openxmlformats.org/presentationml/2006/main">
-  <p:cSld>
     <p:spTree>
       <p:nvGrpSpPr>
         <p:cNvPr id="1" name=""/>
@@ -27110,7 +26707,7 @@
           <a:p>
             <a:r>
               <a:rPr lang="en-US" u="sng" dirty="0"/>
-              <a:t>Demo Stuff:</a:t>
+              <a:t>Demo Stuff: Postman = 3000</a:t>
             </a:r>
           </a:p>
           <a:p>
@@ -27151,6 +26748,170 @@
     <p:extLst>
       <p:ext uri="{BB962C8B-B14F-4D97-AF65-F5344CB8AC3E}">
         <p14:creationId xmlns:p14="http://schemas.microsoft.com/office/powerpoint/2010/main" val="1458062876"/>
+      </p:ext>
+    </p:extLst>
+  </p:cSld>
+  <p:clrMapOvr>
+    <a:masterClrMapping/>
+  </p:clrMapOvr>
+</p:sld>
+</file>
+
+<file path=ppt/slides/slide9.xml><?xml version="1.0" encoding="utf-8"?>
+<p:sld xmlns:a="http://schemas.openxmlformats.org/drawingml/2006/main" xmlns:r="http://schemas.openxmlformats.org/officeDocument/2006/relationships" xmlns:p="http://schemas.openxmlformats.org/presentationml/2006/main">
+  <p:cSld>
+    <p:bg>
+      <p:bgPr>
+        <a:blipFill rotWithShape="1">
+          <a:blip r:embed="rId2">
+            <a:duotone>
+              <a:schemeClr val="bg2">
+                <a:shade val="80000"/>
+                <a:lumMod val="80000"/>
+              </a:schemeClr>
+              <a:schemeClr val="bg2">
+                <a:tint val="98000"/>
+              </a:schemeClr>
+            </a:duotone>
+          </a:blip>
+          <a:stretch/>
+        </a:blipFill>
+        <a:effectLst/>
+      </p:bgPr>
+    </p:bg>
+    <p:spTree>
+      <p:nvGrpSpPr>
+        <p:cNvPr id="1" name=""/>
+        <p:cNvGrpSpPr/>
+        <p:nvPr/>
+      </p:nvGrpSpPr>
+      <p:grpSpPr>
+        <a:xfrm>
+          <a:off x="0" y="0"/>
+          <a:ext cx="0" cy="0"/>
+          <a:chOff x="0" y="0"/>
+          <a:chExt cx="0" cy="0"/>
+        </a:xfrm>
+      </p:grpSpPr>
+      <p:sp>
+        <p:nvSpPr>
+          <p:cNvPr id="2" name="Title 1">
+            <a:extLst>
+              <a:ext uri="{FF2B5EF4-FFF2-40B4-BE49-F238E27FC236}">
+                <a16:creationId xmlns:a16="http://schemas.microsoft.com/office/drawing/2014/main" id="{66A47F5C-50EC-416A-AE8C-6F6BB4225673}"/>
+              </a:ext>
+            </a:extLst>
+          </p:cNvPr>
+          <p:cNvSpPr>
+            <a:spLocks noGrp="1"/>
+          </p:cNvSpPr>
+          <p:nvPr>
+            <p:ph type="title"/>
+          </p:nvPr>
+        </p:nvSpPr>
+        <p:spPr>
+          <a:xfrm>
+            <a:off x="633743" y="609599"/>
+            <a:ext cx="3413156" cy="5273675"/>
+          </a:xfrm>
+        </p:spPr>
+        <p:txBody>
+          <a:bodyPr>
+            <a:normAutofit/>
+          </a:bodyPr>
+          <a:lstStyle/>
+          <a:p>
+            <a:r>
+              <a:rPr lang="en-US" dirty="0" err="1"/>
+              <a:t>TeamStats</a:t>
+            </a:r>
+            <a:r>
+              <a:rPr lang="en-US" dirty="0"/>
+              <a:t>: Design &amp; Patterns</a:t>
+            </a:r>
+          </a:p>
+        </p:txBody>
+      </p:sp>
+      <p:pic>
+        <p:nvPicPr>
+          <p:cNvPr id="9" name="Picture 8">
+            <a:extLst>
+              <a:ext uri="{FF2B5EF4-FFF2-40B4-BE49-F238E27FC236}">
+                <a16:creationId xmlns:a16="http://schemas.microsoft.com/office/drawing/2014/main" id="{B577D423-FE81-4236-89DE-39776B810941}"/>
+              </a:ext>
+              <a:ext uri="{C183D7F6-B498-43B3-948B-1728B52AA6E4}">
+                <adec:decorative xmlns:adec="http://schemas.microsoft.com/office/drawing/2017/decorative" val="1"/>
+              </a:ext>
+            </a:extLst>
+          </p:cNvPr>
+          <p:cNvPicPr>
+            <a:picLocks noGrp="1" noRot="1" noChangeAspect="1" noMove="1" noResize="1" noEditPoints="1" noAdjustHandles="1" noChangeArrowheads="1" noChangeShapeType="1" noCrop="1"/>
+          </p:cNvPicPr>
+          <p:nvPr>
+            <p:extLst>
+              <p:ext uri="{386F3935-93C4-4BCD-93E2-E3B085C9AB24}">
+                <p16:designElem xmlns:p16="http://schemas.microsoft.com/office/powerpoint/2015/main" val="1"/>
+              </p:ext>
+            </p:extLst>
+          </p:nvPr>
+        </p:nvPicPr>
+        <p:blipFill>
+          <a:blip r:embed="rId3">
+            <a:extLst>
+              <a:ext uri="{28A0092B-C50C-407E-A947-70E740481C1C}">
+                <a14:useLocalDpi xmlns:a14="http://schemas.microsoft.com/office/drawing/2010/main" val="0"/>
+              </a:ext>
+            </a:extLst>
+          </a:blip>
+          <a:stretch>
+            <a:fillRect/>
+          </a:stretch>
+        </p:blipFill>
+        <p:spPr>
+          <a:xfrm>
+            <a:off x="4680641" y="609599"/>
+            <a:ext cx="6889687" cy="5273675"/>
+          </a:xfrm>
+          <a:prstGeom prst="rect">
+            <a:avLst/>
+          </a:prstGeom>
+        </p:spPr>
+      </p:pic>
+      <p:graphicFrame>
+        <p:nvGraphicFramePr>
+          <p:cNvPr id="4" name="Content Placeholder 2" descr="SmartArt graphic">
+            <a:extLst>
+              <a:ext uri="{FF2B5EF4-FFF2-40B4-BE49-F238E27FC236}">
+                <a16:creationId xmlns:a16="http://schemas.microsoft.com/office/drawing/2014/main" id="{59F5A1AC-D08D-42AE-B94A-1CAFB517D846}"/>
+              </a:ext>
+            </a:extLst>
+          </p:cNvPr>
+          <p:cNvGraphicFramePr>
+            <a:graphicFrameLocks noGrp="1"/>
+          </p:cNvGraphicFramePr>
+          <p:nvPr>
+            <p:ph idx="1"/>
+            <p:extLst>
+              <p:ext uri="{D42A27DB-BD31-4B8C-83A1-F6EECF244321}">
+                <p14:modId xmlns:p14="http://schemas.microsoft.com/office/powerpoint/2010/main" val="3260550571"/>
+              </p:ext>
+            </p:extLst>
+          </p:nvPr>
+        </p:nvGraphicFramePr>
+        <p:xfrm>
+          <a:off x="4958257" y="887213"/>
+          <a:ext cx="6309300" cy="4718448"/>
+        </p:xfrm>
+        <a:graphic>
+          <a:graphicData uri="http://schemas.openxmlformats.org/drawingml/2006/diagram">
+            <dgm:relIds xmlns:dgm="http://schemas.openxmlformats.org/drawingml/2006/diagram" xmlns:r="http://schemas.openxmlformats.org/officeDocument/2006/relationships" r:dm="rId4" r:lo="rId5" r:qs="rId6" r:cs="rId7"/>
+          </a:graphicData>
+        </a:graphic>
+      </p:graphicFrame>
+    </p:spTree>
+    <p:extLst>
+      <p:ext uri="{BB962C8B-B14F-4D97-AF65-F5344CB8AC3E}">
+        <p14:creationId xmlns:p14="http://schemas.microsoft.com/office/powerpoint/2010/main" val="3012861598"/>
       </p:ext>
     </p:extLst>
   </p:cSld>

</xml_diff>